<commit_message>
Agregada landing page del administrador
</commit_message>
<xml_diff>
--- a/Levantamiento Taller UAPA.pptx
+++ b/Levantamiento Taller UAPA.pptx
@@ -265,7 +265,7 @@
           <a:p>
             <a:fld id="{00DCE7FF-A13B-4E31-8A7E-3211D2564F78}" type="datetimeFigureOut">
               <a:rPr lang="en-US" smtClean="0"/>
-              <a:t>11-Mar-22</a:t>
+              <a:t>16-Mar-22</a:t>
             </a:fld>
             <a:endParaRPr lang="en-US"/>
           </a:p>
@@ -463,7 +463,7 @@
           <a:p>
             <a:fld id="{00DCE7FF-A13B-4E31-8A7E-3211D2564F78}" type="datetimeFigureOut">
               <a:rPr lang="en-US" smtClean="0"/>
-              <a:t>11-Mar-22</a:t>
+              <a:t>16-Mar-22</a:t>
             </a:fld>
             <a:endParaRPr lang="en-US"/>
           </a:p>
@@ -671,7 +671,7 @@
           <a:p>
             <a:fld id="{00DCE7FF-A13B-4E31-8A7E-3211D2564F78}" type="datetimeFigureOut">
               <a:rPr lang="en-US" smtClean="0"/>
-              <a:t>11-Mar-22</a:t>
+              <a:t>16-Mar-22</a:t>
             </a:fld>
             <a:endParaRPr lang="en-US"/>
           </a:p>
@@ -869,7 +869,7 @@
           <a:p>
             <a:fld id="{00DCE7FF-A13B-4E31-8A7E-3211D2564F78}" type="datetimeFigureOut">
               <a:rPr lang="en-US" smtClean="0"/>
-              <a:t>11-Mar-22</a:t>
+              <a:t>16-Mar-22</a:t>
             </a:fld>
             <a:endParaRPr lang="en-US"/>
           </a:p>
@@ -1144,7 +1144,7 @@
           <a:p>
             <a:fld id="{00DCE7FF-A13B-4E31-8A7E-3211D2564F78}" type="datetimeFigureOut">
               <a:rPr lang="en-US" smtClean="0"/>
-              <a:t>11-Mar-22</a:t>
+              <a:t>16-Mar-22</a:t>
             </a:fld>
             <a:endParaRPr lang="en-US"/>
           </a:p>
@@ -1409,7 +1409,7 @@
           <a:p>
             <a:fld id="{00DCE7FF-A13B-4E31-8A7E-3211D2564F78}" type="datetimeFigureOut">
               <a:rPr lang="en-US" smtClean="0"/>
-              <a:t>11-Mar-22</a:t>
+              <a:t>16-Mar-22</a:t>
             </a:fld>
             <a:endParaRPr lang="en-US"/>
           </a:p>
@@ -1821,7 +1821,7 @@
           <a:p>
             <a:fld id="{00DCE7FF-A13B-4E31-8A7E-3211D2564F78}" type="datetimeFigureOut">
               <a:rPr lang="en-US" smtClean="0"/>
-              <a:t>11-Mar-22</a:t>
+              <a:t>16-Mar-22</a:t>
             </a:fld>
             <a:endParaRPr lang="en-US"/>
           </a:p>
@@ -1962,7 +1962,7 @@
           <a:p>
             <a:fld id="{00DCE7FF-A13B-4E31-8A7E-3211D2564F78}" type="datetimeFigureOut">
               <a:rPr lang="en-US" smtClean="0"/>
-              <a:t>11-Mar-22</a:t>
+              <a:t>16-Mar-22</a:t>
             </a:fld>
             <a:endParaRPr lang="en-US"/>
           </a:p>
@@ -2075,7 +2075,7 @@
           <a:p>
             <a:fld id="{00DCE7FF-A13B-4E31-8A7E-3211D2564F78}" type="datetimeFigureOut">
               <a:rPr lang="en-US" smtClean="0"/>
-              <a:t>11-Mar-22</a:t>
+              <a:t>16-Mar-22</a:t>
             </a:fld>
             <a:endParaRPr lang="en-US"/>
           </a:p>
@@ -2386,7 +2386,7 @@
           <a:p>
             <a:fld id="{00DCE7FF-A13B-4E31-8A7E-3211D2564F78}" type="datetimeFigureOut">
               <a:rPr lang="en-US" smtClean="0"/>
-              <a:t>11-Mar-22</a:t>
+              <a:t>16-Mar-22</a:t>
             </a:fld>
             <a:endParaRPr lang="en-US"/>
           </a:p>
@@ -2674,7 +2674,7 @@
           <a:p>
             <a:fld id="{00DCE7FF-A13B-4E31-8A7E-3211D2564F78}" type="datetimeFigureOut">
               <a:rPr lang="en-US" smtClean="0"/>
-              <a:t>11-Mar-22</a:t>
+              <a:t>16-Mar-22</a:t>
             </a:fld>
             <a:endParaRPr lang="en-US"/>
           </a:p>
@@ -2915,7 +2915,7 @@
           <a:p>
             <a:fld id="{00DCE7FF-A13B-4E31-8A7E-3211D2564F78}" type="datetimeFigureOut">
               <a:rPr lang="en-US" smtClean="0"/>
-              <a:t>11-Mar-22</a:t>
+              <a:t>16-Mar-22</a:t>
             </a:fld>
             <a:endParaRPr lang="en-US"/>
           </a:p>
@@ -3650,7 +3650,7 @@
           <a:graphicData uri="http://schemas.openxmlformats.org/presentationml/2006/ole">
             <mc:AlternateContent xmlns:mc="http://schemas.openxmlformats.org/markup-compatibility/2006">
               <mc:Choice xmlns:v="urn:schemas-microsoft-com:vml" Requires="v">
-                <p:oleObj spid="_x0000_s1031" name="Worksheet" showAsIcon="1" r:id="rId4" imgW="914400" imgH="771480" progId="Excel.Sheet.12">
+                <p:oleObj spid="_x0000_s1032" name="Worksheet" showAsIcon="1" r:id="rId4" imgW="914400" imgH="771480" progId="Excel.Sheet.12">
                   <p:embed/>
                 </p:oleObj>
               </mc:Choice>
@@ -5378,7 +5378,7 @@
         </p:nvGrpSpPr>
         <p:grpSpPr>
           <a:xfrm>
-            <a:off x="3192528" y="1057737"/>
+            <a:off x="2508518" y="2421228"/>
             <a:ext cx="7677239" cy="5537916"/>
             <a:chOff x="3282682" y="669701"/>
             <a:chExt cx="7677239" cy="5537916"/>
@@ -6950,244 +6950,296 @@
           <a:chExt cx="0" cy="0"/>
         </a:xfrm>
       </p:grpSpPr>
-      <p:grpSp>
-        <p:nvGrpSpPr>
-          <p:cNvPr id="14" name="Group 13">
-            <a:extLst>
-              <a:ext uri="{FF2B5EF4-FFF2-40B4-BE49-F238E27FC236}">
-                <a16:creationId xmlns:a16="http://schemas.microsoft.com/office/drawing/2014/main" id="{73FD10F1-8D71-4575-A6C8-3BB639C7EF6C}"/>
-              </a:ext>
-            </a:extLst>
-          </p:cNvPr>
-          <p:cNvGrpSpPr/>
+      <p:pic>
+        <p:nvPicPr>
+          <p:cNvPr id="2050" name="Picture 2">
+            <a:extLst>
+              <a:ext uri="{FF2B5EF4-FFF2-40B4-BE49-F238E27FC236}">
+                <a16:creationId xmlns:a16="http://schemas.microsoft.com/office/drawing/2014/main" id="{B932D94A-C72E-4FC2-BBDE-F0B9A474C0C9}"/>
+              </a:ext>
+            </a:extLst>
+          </p:cNvPr>
+          <p:cNvPicPr>
+            <a:picLocks noChangeAspect="1" noChangeArrowheads="1"/>
+          </p:cNvPicPr>
           <p:nvPr/>
-        </p:nvGrpSpPr>
-        <p:grpSpPr>
+        </p:nvPicPr>
+        <p:blipFill>
+          <a:blip r:embed="rId2">
+            <a:extLst>
+              <a:ext uri="{28A0092B-C50C-407E-A947-70E740481C1C}">
+                <a14:useLocalDpi xmlns:a14="http://schemas.microsoft.com/office/drawing/2010/main" val="0"/>
+              </a:ext>
+            </a:extLst>
+          </a:blip>
+          <a:srcRect/>
+          <a:stretch>
+            <a:fillRect/>
+          </a:stretch>
+        </p:blipFill>
+        <p:spPr bwMode="auto">
           <a:xfrm>
             <a:off x="1273174" y="933450"/>
-            <a:ext cx="6626226" cy="3070420"/>
-            <a:chOff x="1273174" y="933450"/>
-            <a:chExt cx="6626226" cy="3070420"/>
+            <a:ext cx="5262355" cy="2495550"/>
           </a:xfrm>
-        </p:grpSpPr>
-        <p:pic>
-          <p:nvPicPr>
-            <p:cNvPr id="2050" name="Picture 2">
-              <a:extLst>
-                <a:ext uri="{FF2B5EF4-FFF2-40B4-BE49-F238E27FC236}">
-                  <a16:creationId xmlns:a16="http://schemas.microsoft.com/office/drawing/2014/main" id="{B932D94A-C72E-4FC2-BBDE-F0B9A474C0C9}"/>
-                </a:ext>
-              </a:extLst>
-            </p:cNvPr>
-            <p:cNvPicPr>
-              <a:picLocks noChangeAspect="1" noChangeArrowheads="1"/>
-            </p:cNvPicPr>
-            <p:nvPr/>
-          </p:nvPicPr>
-          <p:blipFill>
-            <a:blip r:embed="rId2">
-              <a:extLst>
-                <a:ext uri="{28A0092B-C50C-407E-A947-70E740481C1C}">
-                  <a14:useLocalDpi xmlns:a14="http://schemas.microsoft.com/office/drawing/2010/main" val="0"/>
-                </a:ext>
-              </a:extLst>
-            </a:blip>
-            <a:srcRect/>
-            <a:stretch>
-              <a:fillRect/>
-            </a:stretch>
-          </p:blipFill>
-          <p:spPr bwMode="auto">
-            <a:xfrm>
-              <a:off x="1273174" y="933450"/>
-              <a:ext cx="5262355" cy="2495550"/>
-            </a:xfrm>
-            <a:prstGeom prst="rect">
-              <a:avLst/>
-            </a:prstGeom>
-            <a:noFill/>
-            <a:extLst>
-              <a:ext uri="{909E8E84-426E-40DD-AFC4-6F175D3DCCD1}">
-                <a14:hiddenFill xmlns:a14="http://schemas.microsoft.com/office/drawing/2010/main">
-                  <a:solidFill>
-                    <a:srgbClr val="FFFFFF"/>
-                  </a:solidFill>
-                </a14:hiddenFill>
-              </a:ext>
-            </a:extLst>
-          </p:spPr>
-        </p:pic>
-        <p:pic>
-          <p:nvPicPr>
-            <p:cNvPr id="2054" name="Picture 6" descr="Taller mecánico logo: imágenes, fotos de stock y vectores | Shutterstock">
-              <a:extLst>
-                <a:ext uri="{FF2B5EF4-FFF2-40B4-BE49-F238E27FC236}">
-                  <a16:creationId xmlns:a16="http://schemas.microsoft.com/office/drawing/2014/main" id="{D0E64646-9986-4DD0-A927-426E0D5AD203}"/>
-                </a:ext>
-              </a:extLst>
-            </p:cNvPr>
-            <p:cNvPicPr>
-              <a:picLocks noChangeAspect="1" noChangeArrowheads="1"/>
-            </p:cNvPicPr>
-            <p:nvPr/>
-          </p:nvPicPr>
-          <p:blipFill rotWithShape="1">
-            <a:blip r:embed="rId3">
-              <a:extLst>
-                <a:ext uri="{28A0092B-C50C-407E-A947-70E740481C1C}">
-                  <a14:useLocalDpi xmlns:a14="http://schemas.microsoft.com/office/drawing/2010/main" val="0"/>
-                </a:ext>
-              </a:extLst>
-            </a:blip>
-            <a:srcRect l="24738" t="17562" r="25188" b="37727"/>
-            <a:stretch/>
-          </p:blipFill>
-          <p:spPr bwMode="auto">
-            <a:xfrm>
-              <a:off x="6209322" y="1702253"/>
-              <a:ext cx="1690078" cy="1625147"/>
-            </a:xfrm>
-            <a:prstGeom prst="rect">
-              <a:avLst/>
-            </a:prstGeom>
-            <a:noFill/>
-            <a:extLst>
-              <a:ext uri="{909E8E84-426E-40DD-AFC4-6F175D3DCCD1}">
-                <a14:hiddenFill xmlns:a14="http://schemas.microsoft.com/office/drawing/2010/main">
-                  <a:solidFill>
-                    <a:srgbClr val="FFFFFF"/>
-                  </a:solidFill>
-                </a14:hiddenFill>
-              </a:ext>
-            </a:extLst>
-          </p:spPr>
-        </p:pic>
-        <p:sp>
-          <p:nvSpPr>
-            <p:cNvPr id="8" name="TextBox 7">
-              <a:extLst>
-                <a:ext uri="{FF2B5EF4-FFF2-40B4-BE49-F238E27FC236}">
-                  <a16:creationId xmlns:a16="http://schemas.microsoft.com/office/drawing/2014/main" id="{DB0F7F2F-22A5-4F8A-AA8A-1D59E2760553}"/>
-                </a:ext>
-              </a:extLst>
-            </p:cNvPr>
-            <p:cNvSpPr txBox="1"/>
-            <p:nvPr/>
-          </p:nvSpPr>
-          <p:spPr>
-            <a:xfrm>
-              <a:off x="1917700" y="3080540"/>
-              <a:ext cx="5319085" cy="923330"/>
-            </a:xfrm>
-            <a:prstGeom prst="rect">
-              <a:avLst/>
-            </a:prstGeom>
-            <a:noFill/>
-          </p:spPr>
-          <p:txBody>
-            <a:bodyPr wrap="none" rtlCol="0">
-              <a:spAutoFit/>
-            </a:bodyPr>
-            <a:lstStyle/>
-            <a:p>
-              <a:r>
-                <a:rPr lang="en-US" sz="5400" b="1" dirty="0">
-                  <a:solidFill>
-                    <a:srgbClr val="030F47"/>
-                  </a:solidFill>
-                  <a:latin typeface="Segoe UI Black" panose="020B0A02040204020203" pitchFamily="34" charset="0"/>
-                  <a:ea typeface="Segoe UI Black" panose="020B0A02040204020203" pitchFamily="34" charset="0"/>
-                </a:rPr>
-                <a:t>AUTO REPAIRS</a:t>
-              </a:r>
-            </a:p>
-          </p:txBody>
-        </p:sp>
-        <p:cxnSp>
-          <p:nvCxnSpPr>
-            <p:cNvPr id="10" name="Straight Connector 9">
-              <a:extLst>
-                <a:ext uri="{FF2B5EF4-FFF2-40B4-BE49-F238E27FC236}">
-                  <a16:creationId xmlns:a16="http://schemas.microsoft.com/office/drawing/2014/main" id="{B6001A11-8E19-4C04-A18A-878ADEA88F59}"/>
-                </a:ext>
-              </a:extLst>
-            </p:cNvPr>
-            <p:cNvCxnSpPr/>
-            <p:nvPr/>
-          </p:nvCxnSpPr>
-          <p:spPr>
-            <a:xfrm>
-              <a:off x="1727200" y="3200400"/>
-              <a:ext cx="5327161" cy="0"/>
-            </a:xfrm>
-            <a:prstGeom prst="line">
-              <a:avLst/>
-            </a:prstGeom>
-            <a:ln w="38100">
-              <a:solidFill>
-                <a:srgbClr val="EC1E2B"/>
-              </a:solidFill>
-            </a:ln>
-          </p:spPr>
-          <p:style>
-            <a:lnRef idx="1">
-              <a:schemeClr val="accent1"/>
-            </a:lnRef>
-            <a:fillRef idx="0">
-              <a:schemeClr val="accent1"/>
-            </a:fillRef>
-            <a:effectRef idx="0">
-              <a:schemeClr val="accent1"/>
-            </a:effectRef>
-            <a:fontRef idx="minor">
-              <a:schemeClr val="tx1"/>
-            </a:fontRef>
-          </p:style>
-        </p:cxnSp>
-        <p:cxnSp>
-          <p:nvCxnSpPr>
-            <p:cNvPr id="15" name="Straight Connector 14">
-              <a:extLst>
-                <a:ext uri="{FF2B5EF4-FFF2-40B4-BE49-F238E27FC236}">
-                  <a16:creationId xmlns:a16="http://schemas.microsoft.com/office/drawing/2014/main" id="{2B8A2E53-D77B-460E-AA2A-CDA4BA930A6E}"/>
-                </a:ext>
-              </a:extLst>
-            </p:cNvPr>
-            <p:cNvCxnSpPr>
-              <a:cxnSpLocks/>
-            </p:cNvCxnSpPr>
-            <p:nvPr/>
-          </p:nvCxnSpPr>
-          <p:spPr>
-            <a:xfrm>
-              <a:off x="7305055" y="3200400"/>
-              <a:ext cx="348761" cy="12700"/>
-            </a:xfrm>
-            <a:prstGeom prst="line">
-              <a:avLst/>
-            </a:prstGeom>
-            <a:ln w="38100">
-              <a:solidFill>
-                <a:srgbClr val="EC1E2B"/>
-              </a:solidFill>
-            </a:ln>
-          </p:spPr>
-          <p:style>
-            <a:lnRef idx="1">
-              <a:schemeClr val="accent1"/>
-            </a:lnRef>
-            <a:fillRef idx="0">
-              <a:schemeClr val="accent1"/>
-            </a:fillRef>
-            <a:effectRef idx="0">
-              <a:schemeClr val="accent1"/>
-            </a:effectRef>
-            <a:fontRef idx="minor">
-              <a:schemeClr val="tx1"/>
-            </a:fontRef>
-          </p:style>
-        </p:cxnSp>
-      </p:grpSp>
+          <a:prstGeom prst="rect">
+            <a:avLst/>
+          </a:prstGeom>
+          <a:noFill/>
+          <a:extLst>
+            <a:ext uri="{909E8E84-426E-40DD-AFC4-6F175D3DCCD1}">
+              <a14:hiddenFill xmlns:a14="http://schemas.microsoft.com/office/drawing/2010/main">
+                <a:solidFill>
+                  <a:srgbClr val="FFFFFF"/>
+                </a:solidFill>
+              </a14:hiddenFill>
+            </a:ext>
+          </a:extLst>
+        </p:spPr>
+      </p:pic>
+      <p:pic>
+        <p:nvPicPr>
+          <p:cNvPr id="2054" name="Picture 6" descr="Taller mecánico logo: imágenes, fotos de stock y vectores | Shutterstock">
+            <a:extLst>
+              <a:ext uri="{FF2B5EF4-FFF2-40B4-BE49-F238E27FC236}">
+                <a16:creationId xmlns:a16="http://schemas.microsoft.com/office/drawing/2014/main" id="{D0E64646-9986-4DD0-A927-426E0D5AD203}"/>
+              </a:ext>
+            </a:extLst>
+          </p:cNvPr>
+          <p:cNvPicPr>
+            <a:picLocks noChangeAspect="1" noChangeArrowheads="1"/>
+          </p:cNvPicPr>
+          <p:nvPr/>
+        </p:nvPicPr>
+        <p:blipFill rotWithShape="1">
+          <a:blip r:embed="rId3">
+            <a:extLst>
+              <a:ext uri="{28A0092B-C50C-407E-A947-70E740481C1C}">
+                <a14:useLocalDpi xmlns:a14="http://schemas.microsoft.com/office/drawing/2010/main" val="0"/>
+              </a:ext>
+            </a:extLst>
+          </a:blip>
+          <a:srcRect l="24738" t="17562" r="25188" b="37727"/>
+          <a:stretch/>
+        </p:blipFill>
+        <p:spPr bwMode="auto">
+          <a:xfrm>
+            <a:off x="6209322" y="1702253"/>
+            <a:ext cx="1690078" cy="1625147"/>
+          </a:xfrm>
+          <a:prstGeom prst="rect">
+            <a:avLst/>
+          </a:prstGeom>
+          <a:noFill/>
+          <a:extLst>
+            <a:ext uri="{909E8E84-426E-40DD-AFC4-6F175D3DCCD1}">
+              <a14:hiddenFill xmlns:a14="http://schemas.microsoft.com/office/drawing/2010/main">
+                <a:solidFill>
+                  <a:srgbClr val="FFFFFF"/>
+                </a:solidFill>
+              </a14:hiddenFill>
+            </a:ext>
+          </a:extLst>
+        </p:spPr>
+      </p:pic>
+      <p:sp>
+        <p:nvSpPr>
+          <p:cNvPr id="8" name="TextBox 7">
+            <a:extLst>
+              <a:ext uri="{FF2B5EF4-FFF2-40B4-BE49-F238E27FC236}">
+                <a16:creationId xmlns:a16="http://schemas.microsoft.com/office/drawing/2014/main" id="{DB0F7F2F-22A5-4F8A-AA8A-1D59E2760553}"/>
+              </a:ext>
+            </a:extLst>
+          </p:cNvPr>
+          <p:cNvSpPr txBox="1"/>
+          <p:nvPr/>
+        </p:nvSpPr>
+        <p:spPr>
+          <a:xfrm>
+            <a:off x="1917700" y="3080540"/>
+            <a:ext cx="5319085" cy="923330"/>
+          </a:xfrm>
+          <a:prstGeom prst="rect">
+            <a:avLst/>
+          </a:prstGeom>
+          <a:noFill/>
+        </p:spPr>
+        <p:txBody>
+          <a:bodyPr wrap="none" rtlCol="0">
+            <a:spAutoFit/>
+          </a:bodyPr>
+          <a:lstStyle/>
+          <a:p>
+            <a:r>
+              <a:rPr lang="en-US" sz="5400" b="1" dirty="0">
+                <a:solidFill>
+                  <a:srgbClr val="030F47"/>
+                </a:solidFill>
+                <a:latin typeface="Segoe UI Black" panose="020B0A02040204020203" pitchFamily="34" charset="0"/>
+                <a:ea typeface="Segoe UI Black" panose="020B0A02040204020203" pitchFamily="34" charset="0"/>
+              </a:rPr>
+              <a:t>AUTO REPAIRS</a:t>
+            </a:r>
+          </a:p>
+        </p:txBody>
+      </p:sp>
+      <p:cxnSp>
+        <p:nvCxnSpPr>
+          <p:cNvPr id="10" name="Straight Connector 9">
+            <a:extLst>
+              <a:ext uri="{FF2B5EF4-FFF2-40B4-BE49-F238E27FC236}">
+                <a16:creationId xmlns:a16="http://schemas.microsoft.com/office/drawing/2014/main" id="{B6001A11-8E19-4C04-A18A-878ADEA88F59}"/>
+              </a:ext>
+            </a:extLst>
+          </p:cNvPr>
+          <p:cNvCxnSpPr/>
+          <p:nvPr/>
+        </p:nvCxnSpPr>
+        <p:spPr>
+          <a:xfrm>
+            <a:off x="1727200" y="3200400"/>
+            <a:ext cx="5327161" cy="0"/>
+          </a:xfrm>
+          <a:prstGeom prst="line">
+            <a:avLst/>
+          </a:prstGeom>
+          <a:ln w="38100">
+            <a:solidFill>
+              <a:srgbClr val="EC1E2B"/>
+            </a:solidFill>
+          </a:ln>
+        </p:spPr>
+        <p:style>
+          <a:lnRef idx="1">
+            <a:schemeClr val="accent1"/>
+          </a:lnRef>
+          <a:fillRef idx="0">
+            <a:schemeClr val="accent1"/>
+          </a:fillRef>
+          <a:effectRef idx="0">
+            <a:schemeClr val="accent1"/>
+          </a:effectRef>
+          <a:fontRef idx="minor">
+            <a:schemeClr val="tx1"/>
+          </a:fontRef>
+        </p:style>
+      </p:cxnSp>
+      <p:cxnSp>
+        <p:nvCxnSpPr>
+          <p:cNvPr id="15" name="Straight Connector 14">
+            <a:extLst>
+              <a:ext uri="{FF2B5EF4-FFF2-40B4-BE49-F238E27FC236}">
+                <a16:creationId xmlns:a16="http://schemas.microsoft.com/office/drawing/2014/main" id="{2B8A2E53-D77B-460E-AA2A-CDA4BA930A6E}"/>
+              </a:ext>
+            </a:extLst>
+          </p:cNvPr>
+          <p:cNvCxnSpPr>
+            <a:cxnSpLocks/>
+          </p:cNvCxnSpPr>
+          <p:nvPr/>
+        </p:nvCxnSpPr>
+        <p:spPr>
+          <a:xfrm>
+            <a:off x="7305055" y="3200400"/>
+            <a:ext cx="348761" cy="12700"/>
+          </a:xfrm>
+          <a:prstGeom prst="line">
+            <a:avLst/>
+          </a:prstGeom>
+          <a:ln w="38100">
+            <a:solidFill>
+              <a:srgbClr val="EC1E2B"/>
+            </a:solidFill>
+          </a:ln>
+        </p:spPr>
+        <p:style>
+          <a:lnRef idx="1">
+            <a:schemeClr val="accent1"/>
+          </a:lnRef>
+          <a:fillRef idx="0">
+            <a:schemeClr val="accent1"/>
+          </a:fillRef>
+          <a:effectRef idx="0">
+            <a:schemeClr val="accent1"/>
+          </a:effectRef>
+          <a:fontRef idx="minor">
+            <a:schemeClr val="tx1"/>
+          </a:fontRef>
+        </p:style>
+      </p:cxnSp>
+      <p:pic>
+        <p:nvPicPr>
+          <p:cNvPr id="9" name="Picture 6" descr="Taller mecánico logo: imágenes, fotos de stock y vectores | Shutterstock">
+            <a:extLst>
+              <a:ext uri="{FF2B5EF4-FFF2-40B4-BE49-F238E27FC236}">
+                <a16:creationId xmlns:a16="http://schemas.microsoft.com/office/drawing/2014/main" id="{940DF605-2087-442B-978E-39AAF158B690}"/>
+              </a:ext>
+            </a:extLst>
+          </p:cNvPr>
+          <p:cNvPicPr>
+            <a:picLocks noChangeAspect="1" noChangeArrowheads="1"/>
+          </p:cNvPicPr>
+          <p:nvPr/>
+        </p:nvPicPr>
+        <p:blipFill rotWithShape="1">
+          <a:blip r:embed="rId4">
+            <a:extLst>
+              <a:ext uri="{BEBA8EAE-BF5A-486C-A8C5-ECC9F3942E4B}">
+                <a14:imgProps xmlns:a14="http://schemas.microsoft.com/office/drawing/2010/main">
+                  <a14:imgLayer r:embed="rId5">
+                    <a14:imgEffect>
+                      <a14:backgroundRemoval t="19286" b="60000" l="28462" r="71923">
+                        <a14:foregroundMark x1="53846" y1="56786" x2="53846" y2="59643"/>
+                        <a14:foregroundMark x1="53077" y1="61071" x2="53077" y2="61071"/>
+                        <a14:foregroundMark x1="28846" y1="43214" x2="28846" y2="43214"/>
+                        <a14:foregroundMark x1="28846" y1="43214" x2="28462" y2="36071"/>
+                        <a14:foregroundMark x1="28462" y1="33929" x2="38462" y2="23929"/>
+                        <a14:foregroundMark x1="38462" y1="23929" x2="49615" y2="21429"/>
+                        <a14:foregroundMark x1="38077" y1="39643" x2="38462" y2="41429"/>
+                        <a14:foregroundMark x1="45000" y1="43214" x2="55769" y2="39643"/>
+                        <a14:foregroundMark x1="32692" y1="34643" x2="40769" y2="48929"/>
+                        <a14:foregroundMark x1="40769" y1="48929" x2="56154" y2="41071"/>
+                        <a14:foregroundMark x1="56154" y1="41071" x2="52692" y2="26786"/>
+                        <a14:foregroundMark x1="52692" y1="26786" x2="47308" y2="27143"/>
+                        <a14:foregroundMark x1="51154" y1="21429" x2="62692" y2="30000"/>
+                        <a14:foregroundMark x1="62692" y1="30000" x2="63846" y2="39286"/>
+                        <a14:foregroundMark x1="42308" y1="19286" x2="52308" y2="20714"/>
+                        <a14:foregroundMark x1="32308" y1="40357" x2="43846" y2="47857"/>
+                        <a14:foregroundMark x1="43846" y1="47857" x2="38077" y2="48214"/>
+                        <a14:foregroundMark x1="71923" y1="37143" x2="68846" y2="41071"/>
+                      </a14:backgroundRemoval>
+                    </a14:imgEffect>
+                  </a14:imgLayer>
+                </a14:imgProps>
+              </a:ext>
+              <a:ext uri="{28A0092B-C50C-407E-A947-70E740481C1C}">
+                <a14:useLocalDpi xmlns:a14="http://schemas.microsoft.com/office/drawing/2010/main" val="0"/>
+              </a:ext>
+            </a:extLst>
+          </a:blip>
+          <a:srcRect l="24738" t="17562" r="25188" b="37727"/>
+          <a:stretch/>
+        </p:blipFill>
+        <p:spPr bwMode="auto">
+          <a:xfrm>
+            <a:off x="8319347" y="1687915"/>
+            <a:ext cx="1690078" cy="1625147"/>
+          </a:xfrm>
+          <a:prstGeom prst="rect">
+            <a:avLst/>
+          </a:prstGeom>
+          <a:noFill/>
+          <a:extLst>
+            <a:ext uri="{909E8E84-426E-40DD-AFC4-6F175D3DCCD1}">
+              <a14:hiddenFill xmlns:a14="http://schemas.microsoft.com/office/drawing/2010/main">
+                <a:solidFill>
+                  <a:srgbClr val="FFFFFF"/>
+                </a:solidFill>
+              </a14:hiddenFill>
+            </a:ext>
+          </a:extLst>
+        </p:spPr>
+      </p:pic>
     </p:spTree>
     <p:extLst>
       <p:ext uri="{BB962C8B-B14F-4D97-AF65-F5344CB8AC3E}">

</xml_diff>

<commit_message>
Se agrego funcionalidad para guardar diagnostico y reparacion
</commit_message>
<xml_diff>
--- a/Levantamiento Taller UAPA.pptx
+++ b/Levantamiento Taller UAPA.pptx
@@ -265,7 +265,7 @@
           <a:p>
             <a:fld id="{00DCE7FF-A13B-4E31-8A7E-3211D2564F78}" type="datetimeFigureOut">
               <a:rPr lang="en-US" smtClean="0"/>
-              <a:t>16-Mar-22</a:t>
+              <a:t>21-Mar-22</a:t>
             </a:fld>
             <a:endParaRPr lang="en-US"/>
           </a:p>
@@ -463,7 +463,7 @@
           <a:p>
             <a:fld id="{00DCE7FF-A13B-4E31-8A7E-3211D2564F78}" type="datetimeFigureOut">
               <a:rPr lang="en-US" smtClean="0"/>
-              <a:t>16-Mar-22</a:t>
+              <a:t>21-Mar-22</a:t>
             </a:fld>
             <a:endParaRPr lang="en-US"/>
           </a:p>
@@ -671,7 +671,7 @@
           <a:p>
             <a:fld id="{00DCE7FF-A13B-4E31-8A7E-3211D2564F78}" type="datetimeFigureOut">
               <a:rPr lang="en-US" smtClean="0"/>
-              <a:t>16-Mar-22</a:t>
+              <a:t>21-Mar-22</a:t>
             </a:fld>
             <a:endParaRPr lang="en-US"/>
           </a:p>
@@ -869,7 +869,7 @@
           <a:p>
             <a:fld id="{00DCE7FF-A13B-4E31-8A7E-3211D2564F78}" type="datetimeFigureOut">
               <a:rPr lang="en-US" smtClean="0"/>
-              <a:t>16-Mar-22</a:t>
+              <a:t>21-Mar-22</a:t>
             </a:fld>
             <a:endParaRPr lang="en-US"/>
           </a:p>
@@ -1144,7 +1144,7 @@
           <a:p>
             <a:fld id="{00DCE7FF-A13B-4E31-8A7E-3211D2564F78}" type="datetimeFigureOut">
               <a:rPr lang="en-US" smtClean="0"/>
-              <a:t>16-Mar-22</a:t>
+              <a:t>21-Mar-22</a:t>
             </a:fld>
             <a:endParaRPr lang="en-US"/>
           </a:p>
@@ -1409,7 +1409,7 @@
           <a:p>
             <a:fld id="{00DCE7FF-A13B-4E31-8A7E-3211D2564F78}" type="datetimeFigureOut">
               <a:rPr lang="en-US" smtClean="0"/>
-              <a:t>16-Mar-22</a:t>
+              <a:t>21-Mar-22</a:t>
             </a:fld>
             <a:endParaRPr lang="en-US"/>
           </a:p>
@@ -1821,7 +1821,7 @@
           <a:p>
             <a:fld id="{00DCE7FF-A13B-4E31-8A7E-3211D2564F78}" type="datetimeFigureOut">
               <a:rPr lang="en-US" smtClean="0"/>
-              <a:t>16-Mar-22</a:t>
+              <a:t>21-Mar-22</a:t>
             </a:fld>
             <a:endParaRPr lang="en-US"/>
           </a:p>
@@ -1962,7 +1962,7 @@
           <a:p>
             <a:fld id="{00DCE7FF-A13B-4E31-8A7E-3211D2564F78}" type="datetimeFigureOut">
               <a:rPr lang="en-US" smtClean="0"/>
-              <a:t>16-Mar-22</a:t>
+              <a:t>21-Mar-22</a:t>
             </a:fld>
             <a:endParaRPr lang="en-US"/>
           </a:p>
@@ -2075,7 +2075,7 @@
           <a:p>
             <a:fld id="{00DCE7FF-A13B-4E31-8A7E-3211D2564F78}" type="datetimeFigureOut">
               <a:rPr lang="en-US" smtClean="0"/>
-              <a:t>16-Mar-22</a:t>
+              <a:t>21-Mar-22</a:t>
             </a:fld>
             <a:endParaRPr lang="en-US"/>
           </a:p>
@@ -2386,7 +2386,7 @@
           <a:p>
             <a:fld id="{00DCE7FF-A13B-4E31-8A7E-3211D2564F78}" type="datetimeFigureOut">
               <a:rPr lang="en-US" smtClean="0"/>
-              <a:t>16-Mar-22</a:t>
+              <a:t>21-Mar-22</a:t>
             </a:fld>
             <a:endParaRPr lang="en-US"/>
           </a:p>
@@ -2674,7 +2674,7 @@
           <a:p>
             <a:fld id="{00DCE7FF-A13B-4E31-8A7E-3211D2564F78}" type="datetimeFigureOut">
               <a:rPr lang="en-US" smtClean="0"/>
-              <a:t>16-Mar-22</a:t>
+              <a:t>21-Mar-22</a:t>
             </a:fld>
             <a:endParaRPr lang="en-US"/>
           </a:p>
@@ -2915,7 +2915,7 @@
           <a:p>
             <a:fld id="{00DCE7FF-A13B-4E31-8A7E-3211D2564F78}" type="datetimeFigureOut">
               <a:rPr lang="en-US" smtClean="0"/>
-              <a:t>16-Mar-22</a:t>
+              <a:t>21-Mar-22</a:t>
             </a:fld>
             <a:endParaRPr lang="en-US"/>
           </a:p>
@@ -3650,7 +3650,7 @@
           <a:graphicData uri="http://schemas.openxmlformats.org/presentationml/2006/ole">
             <mc:AlternateContent xmlns:mc="http://schemas.openxmlformats.org/markup-compatibility/2006">
               <mc:Choice xmlns:v="urn:schemas-microsoft-com:vml" Requires="v">
-                <p:oleObj spid="_x0000_s1032" name="Worksheet" showAsIcon="1" r:id="rId4" imgW="914400" imgH="771480" progId="Excel.Sheet.12">
+                <p:oleObj spid="_x0000_s1033" name="Worksheet" showAsIcon="1" r:id="rId4" imgW="914400" imgH="771480" progId="Excel.Sheet.12">
                   <p:embed/>
                 </p:oleObj>
               </mc:Choice>
@@ -6555,7 +6555,7 @@
         </p:nvGrpSpPr>
         <p:grpSpPr>
           <a:xfrm>
-            <a:off x="2508518" y="845188"/>
+            <a:off x="2593662" y="2662158"/>
             <a:ext cx="7677239" cy="5537916"/>
             <a:chOff x="4003897" y="925132"/>
             <a:chExt cx="7677239" cy="5537916"/>

</xml_diff>